<commit_message>
update code and figure and tables used in manuscript
</commit_message>
<xml_diff>
--- a/presentations/Summary_of_Results.pptx
+++ b/presentations/Summary_of_Results.pptx
@@ -104,6 +104,11 @@
       </a:defRPr>
     </a:lvl9pPr>
   </p:defaultTextStyle>
+  <p:extLst>
+    <p:ext uri="{EFAFB233-063F-42B5-8137-9DF3F51BA10A}">
+      <p15:sldGuideLst xmlns:p15="http://schemas.microsoft.com/office/powerpoint/2012/main"/>
+    </p:ext>
+  </p:extLst>
 </p:presentation>
 </file>
 
@@ -238,7 +243,7 @@
           <a:p>
             <a:fld id="{F36C2903-9E06-8C41-ABBC-3F8065A79374}" type="datetimeFigureOut">
               <a:rPr lang="en-US" smtClean="0"/>
-              <a:t>11/22/19</a:t>
+              <a:t>11/25/19</a:t>
             </a:fld>
             <a:endParaRPr lang="en-US"/>
           </a:p>
@@ -408,7 +413,7 @@
           <a:p>
             <a:fld id="{F36C2903-9E06-8C41-ABBC-3F8065A79374}" type="datetimeFigureOut">
               <a:rPr lang="en-US" smtClean="0"/>
-              <a:t>11/22/19</a:t>
+              <a:t>11/25/19</a:t>
             </a:fld>
             <a:endParaRPr lang="en-US"/>
           </a:p>
@@ -588,7 +593,7 @@
           <a:p>
             <a:fld id="{F36C2903-9E06-8C41-ABBC-3F8065A79374}" type="datetimeFigureOut">
               <a:rPr lang="en-US" smtClean="0"/>
-              <a:t>11/22/19</a:t>
+              <a:t>11/25/19</a:t>
             </a:fld>
             <a:endParaRPr lang="en-US"/>
           </a:p>
@@ -758,7 +763,7 @@
           <a:p>
             <a:fld id="{F36C2903-9E06-8C41-ABBC-3F8065A79374}" type="datetimeFigureOut">
               <a:rPr lang="en-US" smtClean="0"/>
-              <a:t>11/22/19</a:t>
+              <a:t>11/25/19</a:t>
             </a:fld>
             <a:endParaRPr lang="en-US"/>
           </a:p>
@@ -1004,7 +1009,7 @@
           <a:p>
             <a:fld id="{F36C2903-9E06-8C41-ABBC-3F8065A79374}" type="datetimeFigureOut">
               <a:rPr lang="en-US" smtClean="0"/>
-              <a:t>11/22/19</a:t>
+              <a:t>11/25/19</a:t>
             </a:fld>
             <a:endParaRPr lang="en-US"/>
           </a:p>
@@ -1236,7 +1241,7 @@
           <a:p>
             <a:fld id="{F36C2903-9E06-8C41-ABBC-3F8065A79374}" type="datetimeFigureOut">
               <a:rPr lang="en-US" smtClean="0"/>
-              <a:t>11/22/19</a:t>
+              <a:t>11/25/19</a:t>
             </a:fld>
             <a:endParaRPr lang="en-US"/>
           </a:p>
@@ -1603,7 +1608,7 @@
           <a:p>
             <a:fld id="{F36C2903-9E06-8C41-ABBC-3F8065A79374}" type="datetimeFigureOut">
               <a:rPr lang="en-US" smtClean="0"/>
-              <a:t>11/22/19</a:t>
+              <a:t>11/25/19</a:t>
             </a:fld>
             <a:endParaRPr lang="en-US"/>
           </a:p>
@@ -1721,7 +1726,7 @@
           <a:p>
             <a:fld id="{F36C2903-9E06-8C41-ABBC-3F8065A79374}" type="datetimeFigureOut">
               <a:rPr lang="en-US" smtClean="0"/>
-              <a:t>11/22/19</a:t>
+              <a:t>11/25/19</a:t>
             </a:fld>
             <a:endParaRPr lang="en-US"/>
           </a:p>
@@ -1816,7 +1821,7 @@
           <a:p>
             <a:fld id="{F36C2903-9E06-8C41-ABBC-3F8065A79374}" type="datetimeFigureOut">
               <a:rPr lang="en-US" smtClean="0"/>
-              <a:t>11/22/19</a:t>
+              <a:t>11/25/19</a:t>
             </a:fld>
             <a:endParaRPr lang="en-US"/>
           </a:p>
@@ -2093,7 +2098,7 @@
           <a:p>
             <a:fld id="{F36C2903-9E06-8C41-ABBC-3F8065A79374}" type="datetimeFigureOut">
               <a:rPr lang="en-US" smtClean="0"/>
-              <a:t>11/22/19</a:t>
+              <a:t>11/25/19</a:t>
             </a:fld>
             <a:endParaRPr lang="en-US"/>
           </a:p>
@@ -2350,7 +2355,7 @@
           <a:p>
             <a:fld id="{F36C2903-9E06-8C41-ABBC-3F8065A79374}" type="datetimeFigureOut">
               <a:rPr lang="en-US" smtClean="0"/>
-              <a:t>11/22/19</a:t>
+              <a:t>11/25/19</a:t>
             </a:fld>
             <a:endParaRPr lang="en-US"/>
           </a:p>
@@ -2563,7 +2568,7 @@
           <a:p>
             <a:fld id="{F36C2903-9E06-8C41-ABBC-3F8065A79374}" type="datetimeFigureOut">
               <a:rPr lang="en-US" smtClean="0"/>
-              <a:t>11/22/19</a:t>
+              <a:t>11/25/19</a:t>
             </a:fld>
             <a:endParaRPr lang="en-US"/>
           </a:p>
@@ -2985,7 +2990,7 @@
               <p:nvPr>
                 <p:extLst>
                   <p:ext uri="{D42A27DB-BD31-4B8C-83A1-F6EECF244321}">
-                    <p14:modId xmlns:p14="http://schemas.microsoft.com/office/powerpoint/2010/main" val="164991745"/>
+                    <p14:modId xmlns:p14="http://schemas.microsoft.com/office/powerpoint/2010/main" val="2348521455"/>
                   </p:ext>
                 </p:extLst>
               </p:nvPr>
@@ -3051,7 +3056,10 @@
                         <a:lstStyle/>
                         <a:p>
                           <a:pPr algn="ctr"/>
-                          <a:endParaRPr lang="en-US" sz="1600" dirty="0"/>
+                          <a:r>
+                            <a:rPr lang="en-US" sz="1600" dirty="0"/>
+                            <a:t>Name</a:t>
+                          </a:r>
                         </a:p>
                       </a:txBody>
                       <a:tcPr anchor="ctr"/>
@@ -3064,7 +3072,7 @@
                           <a:pPr algn="ctr"/>
                           <a:r>
                             <a:rPr lang="en-US" sz="1600" dirty="0"/>
-                            <a:t>In vitro</a:t>
+                            <a:t>Binding</a:t>
                           </a:r>
                         </a:p>
                       </a:txBody>
@@ -3088,7 +3096,7 @@
                           <a:pPr algn="ctr"/>
                           <a:r>
                             <a:rPr lang="en-US" sz="1600" dirty="0"/>
-                            <a:t>In vivo</a:t>
+                            <a:t>TMDD</a:t>
                           </a:r>
                         </a:p>
                       </a:txBody>
@@ -3102,7 +3110,7 @@
                           <a:pPr algn="ctr"/>
                           <a:r>
                             <a:rPr lang="en-US" sz="1600" dirty="0"/>
-                            <a:t>In vivo</a:t>
+                            <a:t>TMDD+L </a:t>
                           </a:r>
                         </a:p>
                       </a:txBody>
@@ -3115,9 +3123,10 @@
                         <a:p>
                           <a:pPr algn="ctr"/>
                           <a:r>
-                            <a:rPr lang="en-US" sz="1600" dirty="0"/>
-                            <a:t>In vivo</a:t>
+                            <a:rPr lang="en-US" sz="1600"/>
+                            <a:t>TMDD+tissue</a:t>
                           </a:r>
+                          <a:endParaRPr lang="en-US" sz="1600" dirty="0"/>
                         </a:p>
                       </a:txBody>
                       <a:tcPr anchor="ctr"/>
@@ -3151,7 +3160,7 @@
                           <a:pPr algn="ctr"/>
                           <a:r>
                             <a:rPr lang="en-US" sz="1600" dirty="0"/>
-                            <a:t>-</a:t>
+                            <a:t>In vitro</a:t>
                           </a:r>
                         </a:p>
                       </a:txBody>
@@ -3905,7 +3914,7 @@
               <p:nvPr>
                 <p:extLst>
                   <p:ext uri="{D42A27DB-BD31-4B8C-83A1-F6EECF244321}">
-                    <p14:modId xmlns:p14="http://schemas.microsoft.com/office/powerpoint/2010/main" val="164991745"/>
+                    <p14:modId xmlns:p14="http://schemas.microsoft.com/office/powerpoint/2010/main" val="2348521455"/>
                   </p:ext>
                 </p:extLst>
               </p:nvPr>
@@ -3971,7 +3980,10 @@
                         <a:lstStyle/>
                         <a:p>
                           <a:pPr algn="ctr"/>
-                          <a:endParaRPr lang="en-US" sz="1600" dirty="0"/>
+                          <a:r>
+                            <a:rPr lang="en-US" sz="1600" dirty="0"/>
+                            <a:t>Name</a:t>
+                          </a:r>
                         </a:p>
                       </a:txBody>
                       <a:tcPr anchor="ctr"/>
@@ -3984,7 +3996,7 @@
                           <a:pPr algn="ctr"/>
                           <a:r>
                             <a:rPr lang="en-US" sz="1600" dirty="0"/>
-                            <a:t>In vitro</a:t>
+                            <a:t>Binding</a:t>
                           </a:r>
                         </a:p>
                       </a:txBody>
@@ -4008,7 +4020,7 @@
                           <a:pPr algn="ctr"/>
                           <a:r>
                             <a:rPr lang="en-US" sz="1600" dirty="0"/>
-                            <a:t>In vivo</a:t>
+                            <a:t>TMDD</a:t>
                           </a:r>
                         </a:p>
                       </a:txBody>
@@ -4022,7 +4034,7 @@
                           <a:pPr algn="ctr"/>
                           <a:r>
                             <a:rPr lang="en-US" sz="1600" dirty="0"/>
-                            <a:t>In vivo</a:t>
+                            <a:t>TMDD+L </a:t>
                           </a:r>
                         </a:p>
                       </a:txBody>
@@ -4035,9 +4047,10 @@
                         <a:p>
                           <a:pPr algn="ctr"/>
                           <a:r>
-                            <a:rPr lang="en-US" sz="1600" dirty="0"/>
-                            <a:t>In vivo</a:t>
+                            <a:rPr lang="en-US" sz="1600"/>
+                            <a:t>TMDD+tissue</a:t>
                           </a:r>
+                          <a:endParaRPr lang="en-US" sz="1600" dirty="0"/>
                         </a:p>
                       </a:txBody>
                       <a:tcPr anchor="ctr"/>
@@ -4071,7 +4084,7 @@
                           <a:pPr algn="ctr"/>
                           <a:r>
                             <a:rPr lang="en-US" sz="1600" dirty="0"/>
-                            <a:t>-</a:t>
+                            <a:t>In vitro</a:t>
                           </a:r>
                         </a:p>
                       </a:txBody>
@@ -6886,8 +6899,8 @@
             </a:p>
           </p:txBody>
         </p:sp>
-        <mc:AlternateContent xmlns:mc="http://schemas.openxmlformats.org/markup-compatibility/2006">
-          <mc:Choice xmlns:a14="http://schemas.microsoft.com/office/drawing/2010/main" Requires="a14">
+        <mc:AlternateContent xmlns:mc="http://schemas.openxmlformats.org/markup-compatibility/2006" xmlns:a14="http://schemas.microsoft.com/office/drawing/2010/main">
+          <mc:Choice Requires="a14">
             <p:sp>
               <p:nvSpPr>
                 <p:cNvPr id="305" name="Rectangle 304">
@@ -6915,6 +6928,7 @@
                 </a:bodyPr>
                 <a:lstStyle/>
                 <a:p>
+                  <a:pPr/>
                   <a14:m>
                     <m:oMathPara xmlns:m="http://schemas.openxmlformats.org/officeDocument/2006/math">
                       <m:oMathParaPr>
@@ -7016,7 +7030,7 @@
               </p:txBody>
             </p:sp>
           </mc:Choice>
-          <mc:Fallback>
+          <mc:Fallback xmlns="">
             <p:sp>
               <p:nvSpPr>
                 <p:cNvPr id="305" name="Rectangle 304">

</xml_diff>

<commit_message>
updating code to find issues
</commit_message>
<xml_diff>
--- a/presentations/Summary_of_Results.pptx
+++ b/presentations/Summary_of_Results.pptx
@@ -243,7 +243,7 @@
           <a:p>
             <a:fld id="{F36C2903-9E06-8C41-ABBC-3F8065A79374}" type="datetimeFigureOut">
               <a:rPr lang="en-US" smtClean="0"/>
-              <a:t>11/25/19</a:t>
+              <a:t>10/11/20</a:t>
             </a:fld>
             <a:endParaRPr lang="en-US"/>
           </a:p>
@@ -413,7 +413,7 @@
           <a:p>
             <a:fld id="{F36C2903-9E06-8C41-ABBC-3F8065A79374}" type="datetimeFigureOut">
               <a:rPr lang="en-US" smtClean="0"/>
-              <a:t>11/25/19</a:t>
+              <a:t>10/11/20</a:t>
             </a:fld>
             <a:endParaRPr lang="en-US"/>
           </a:p>
@@ -593,7 +593,7 @@
           <a:p>
             <a:fld id="{F36C2903-9E06-8C41-ABBC-3F8065A79374}" type="datetimeFigureOut">
               <a:rPr lang="en-US" smtClean="0"/>
-              <a:t>11/25/19</a:t>
+              <a:t>10/11/20</a:t>
             </a:fld>
             <a:endParaRPr lang="en-US"/>
           </a:p>
@@ -763,7 +763,7 @@
           <a:p>
             <a:fld id="{F36C2903-9E06-8C41-ABBC-3F8065A79374}" type="datetimeFigureOut">
               <a:rPr lang="en-US" smtClean="0"/>
-              <a:t>11/25/19</a:t>
+              <a:t>10/11/20</a:t>
             </a:fld>
             <a:endParaRPr lang="en-US"/>
           </a:p>
@@ -1009,7 +1009,7 @@
           <a:p>
             <a:fld id="{F36C2903-9E06-8C41-ABBC-3F8065A79374}" type="datetimeFigureOut">
               <a:rPr lang="en-US" smtClean="0"/>
-              <a:t>11/25/19</a:t>
+              <a:t>10/11/20</a:t>
             </a:fld>
             <a:endParaRPr lang="en-US"/>
           </a:p>
@@ -1241,7 +1241,7 @@
           <a:p>
             <a:fld id="{F36C2903-9E06-8C41-ABBC-3F8065A79374}" type="datetimeFigureOut">
               <a:rPr lang="en-US" smtClean="0"/>
-              <a:t>11/25/19</a:t>
+              <a:t>10/11/20</a:t>
             </a:fld>
             <a:endParaRPr lang="en-US"/>
           </a:p>
@@ -1608,7 +1608,7 @@
           <a:p>
             <a:fld id="{F36C2903-9E06-8C41-ABBC-3F8065A79374}" type="datetimeFigureOut">
               <a:rPr lang="en-US" smtClean="0"/>
-              <a:t>11/25/19</a:t>
+              <a:t>10/11/20</a:t>
             </a:fld>
             <a:endParaRPr lang="en-US"/>
           </a:p>
@@ -1726,7 +1726,7 @@
           <a:p>
             <a:fld id="{F36C2903-9E06-8C41-ABBC-3F8065A79374}" type="datetimeFigureOut">
               <a:rPr lang="en-US" smtClean="0"/>
-              <a:t>11/25/19</a:t>
+              <a:t>10/11/20</a:t>
             </a:fld>
             <a:endParaRPr lang="en-US"/>
           </a:p>
@@ -1821,7 +1821,7 @@
           <a:p>
             <a:fld id="{F36C2903-9E06-8C41-ABBC-3F8065A79374}" type="datetimeFigureOut">
               <a:rPr lang="en-US" smtClean="0"/>
-              <a:t>11/25/19</a:t>
+              <a:t>10/11/20</a:t>
             </a:fld>
             <a:endParaRPr lang="en-US"/>
           </a:p>
@@ -2098,7 +2098,7 @@
           <a:p>
             <a:fld id="{F36C2903-9E06-8C41-ABBC-3F8065A79374}" type="datetimeFigureOut">
               <a:rPr lang="en-US" smtClean="0"/>
-              <a:t>11/25/19</a:t>
+              <a:t>10/11/20</a:t>
             </a:fld>
             <a:endParaRPr lang="en-US"/>
           </a:p>
@@ -2355,7 +2355,7 @@
           <a:p>
             <a:fld id="{F36C2903-9E06-8C41-ABBC-3F8065A79374}" type="datetimeFigureOut">
               <a:rPr lang="en-US" smtClean="0"/>
-              <a:t>11/25/19</a:t>
+              <a:t>10/11/20</a:t>
             </a:fld>
             <a:endParaRPr lang="en-US"/>
           </a:p>
@@ -2568,7 +2568,7 @@
           <a:p>
             <a:fld id="{F36C2903-9E06-8C41-ABBC-3F8065A79374}" type="datetimeFigureOut">
               <a:rPr lang="en-US" smtClean="0"/>
-              <a:t>11/25/19</a:t>
+              <a:t>10/11/20</a:t>
             </a:fld>
             <a:endParaRPr lang="en-US"/>
           </a:p>
@@ -2990,14 +2990,14 @@
               <p:nvPr>
                 <p:extLst>
                   <p:ext uri="{D42A27DB-BD31-4B8C-83A1-F6EECF244321}">
-                    <p14:modId xmlns:p14="http://schemas.microsoft.com/office/powerpoint/2010/main" val="2348521455"/>
+                    <p14:modId xmlns:p14="http://schemas.microsoft.com/office/powerpoint/2010/main" val="3565457344"/>
                   </p:ext>
                 </p:extLst>
               </p:nvPr>
             </p:nvGraphicFramePr>
             <p:xfrm>
               <a:off x="196818" y="1052057"/>
-              <a:ext cx="10555099" cy="5553280"/>
+              <a:ext cx="10555099" cy="5719133"/>
             </p:xfrm>
             <a:graphic>
               <a:graphicData uri="http://schemas.openxmlformats.org/drawingml/2006/table">
@@ -3027,21 +3027,21 @@
                         </a:ext>
                       </a:extLst>
                     </a:gridCol>
-                    <a:gridCol w="2302043">
+                    <a:gridCol w="2243945">
                       <a:extLst>
                         <a:ext uri="{9D8B030D-6E8A-4147-A177-3AD203B41FA5}">
                           <a16:colId xmlns:a16="http://schemas.microsoft.com/office/drawing/2014/main" val="1583916392"/>
                         </a:ext>
                       </a:extLst>
                     </a:gridCol>
-                    <a:gridCol w="2486206">
+                    <a:gridCol w="2581155">
                       <a:extLst>
                         <a:ext uri="{9D8B030D-6E8A-4147-A177-3AD203B41FA5}">
                           <a16:colId xmlns:a16="http://schemas.microsoft.com/office/drawing/2014/main" val="2208840777"/>
                         </a:ext>
                       </a:extLst>
                     </a:gridCol>
-                    <a:gridCol w="2443421">
+                    <a:gridCol w="2406570">
                       <a:extLst>
                         <a:ext uri="{9D8B030D-6E8A-4147-A177-3AD203B41FA5}">
                           <a16:colId xmlns:a16="http://schemas.microsoft.com/office/drawing/2014/main" val="278051661"/>
@@ -3110,7 +3110,7 @@
                           <a:pPr algn="ctr"/>
                           <a:r>
                             <a:rPr lang="en-US" sz="1600" dirty="0"/>
-                            <a:t>TMDD+L </a:t>
+                            <a:t>Competitive TMDD </a:t>
                           </a:r>
                         </a:p>
                       </a:txBody>
@@ -3124,7 +3124,7 @@
                           <a:pPr algn="ctr"/>
                           <a:r>
                             <a:rPr lang="en-US" sz="1600"/>
-                            <a:t>TMDD+tissue</a:t>
+                            <a:t>Tissue TMDD</a:t>
                           </a:r>
                           <a:endParaRPr lang="en-US" sz="1600" dirty="0"/>
                         </a:p>
@@ -3460,6 +3460,21 @@
                                       </a:rPr>
                                       <m:t>fold</m:t>
                                     </m:r>
+                                    <m:r>
+                                      <a:rPr lang="en-US" sz="1600" b="0" i="0" smtClean="0">
+                                        <a:latin typeface="Cambria Math" panose="02040503050406030204" pitchFamily="18" charset="0"/>
+                                      </a:rPr>
+                                      <m:t>,</m:t>
+                                    </m:r>
+                                    <m:r>
+                                      <m:rPr>
+                                        <m:sty m:val="p"/>
+                                      </m:rPr>
+                                      <a:rPr lang="en-US" sz="1600" b="0" i="0" smtClean="0">
+                                        <a:latin typeface="Cambria Math" panose="02040503050406030204" pitchFamily="18" charset="0"/>
+                                      </a:rPr>
+                                      <m:t>largeD</m:t>
+                                    </m:r>
                                   </m:sub>
                                 </m:sSub>
                               </m:oMath>
@@ -3542,6 +3557,21 @@
                                       </a:rPr>
                                       <m:t>fold</m:t>
                                     </m:r>
+                                    <m:r>
+                                      <a:rPr lang="en-US" sz="1600" b="0" i="0" smtClean="0">
+                                        <a:latin typeface="Cambria Math" panose="02040503050406030204" pitchFamily="18" charset="0"/>
+                                      </a:rPr>
+                                      <m:t>,</m:t>
+                                    </m:r>
+                                    <m:r>
+                                      <m:rPr>
+                                        <m:sty m:val="p"/>
+                                      </m:rPr>
+                                      <a:rPr lang="en-US" sz="1600" b="0" i="0" smtClean="0">
+                                        <a:latin typeface="Cambria Math" panose="02040503050406030204" pitchFamily="18" charset="0"/>
+                                      </a:rPr>
+                                      <m:t>largeD</m:t>
+                                    </m:r>
                                   </m:sub>
                                 </m:sSub>
                                 <m:r>
@@ -3575,6 +3605,21 @@
                                         <a:latin typeface="Cambria Math" panose="02040503050406030204" pitchFamily="18" charset="0"/>
                                       </a:rPr>
                                       <m:t>fold</m:t>
+                                    </m:r>
+                                    <m:r>
+                                      <a:rPr lang="en-US" sz="1600" b="0" i="0" smtClean="0">
+                                        <a:latin typeface="Cambria Math" panose="02040503050406030204" pitchFamily="18" charset="0"/>
+                                      </a:rPr>
+                                      <m:t>,</m:t>
+                                    </m:r>
+                                    <m:r>
+                                      <m:rPr>
+                                        <m:sty m:val="p"/>
+                                      </m:rPr>
+                                      <a:rPr lang="en-US" sz="1600" b="0" i="0" smtClean="0">
+                                        <a:latin typeface="Cambria Math" panose="02040503050406030204" pitchFamily="18" charset="0"/>
+                                      </a:rPr>
+                                      <m:t>largeD</m:t>
                                     </m:r>
                                   </m:sub>
                                 </m:sSub>
@@ -3666,6 +3711,21 @@
                                             <a:latin typeface="Cambria Math" panose="02040503050406030204" pitchFamily="18" charset="0"/>
                                           </a:rPr>
                                           <m:t>fold</m:t>
+                                        </m:r>
+                                        <m:r>
+                                          <a:rPr lang="en-US" sz="1600" b="0" i="0" smtClean="0">
+                                            <a:latin typeface="Cambria Math" panose="02040503050406030204" pitchFamily="18" charset="0"/>
+                                          </a:rPr>
+                                          <m:t>,</m:t>
+                                        </m:r>
+                                        <m:r>
+                                          <m:rPr>
+                                            <m:sty m:val="p"/>
+                                          </m:rPr>
+                                          <a:rPr lang="en-US" sz="1600" b="0" i="0" smtClean="0">
+                                            <a:latin typeface="Cambria Math" panose="02040503050406030204" pitchFamily="18" charset="0"/>
+                                          </a:rPr>
+                                          <m:t>largeD</m:t>
                                         </m:r>
                                       </m:sub>
                                     </m:sSub>
@@ -3776,7 +3836,7 @@
                       </a:ext>
                     </a:extLst>
                   </a:tr>
-                  <a:tr h="1673061">
+                  <a:tr h="1838914">
                     <a:tc gridSpan="2">
                       <a:txBody>
                         <a:bodyPr/>
@@ -3914,14 +3974,14 @@
               <p:nvPr>
                 <p:extLst>
                   <p:ext uri="{D42A27DB-BD31-4B8C-83A1-F6EECF244321}">
-                    <p14:modId xmlns:p14="http://schemas.microsoft.com/office/powerpoint/2010/main" val="2348521455"/>
+                    <p14:modId xmlns:p14="http://schemas.microsoft.com/office/powerpoint/2010/main" val="3565457344"/>
                   </p:ext>
                 </p:extLst>
               </p:nvPr>
             </p:nvGraphicFramePr>
             <p:xfrm>
               <a:off x="196818" y="1052057"/>
-              <a:ext cx="10555099" cy="5553280"/>
+              <a:ext cx="10555099" cy="5719133"/>
             </p:xfrm>
             <a:graphic>
               <a:graphicData uri="http://schemas.openxmlformats.org/drawingml/2006/table">
@@ -3951,21 +4011,21 @@
                         </a:ext>
                       </a:extLst>
                     </a:gridCol>
-                    <a:gridCol w="2302043">
+                    <a:gridCol w="2243945">
                       <a:extLst>
                         <a:ext uri="{9D8B030D-6E8A-4147-A177-3AD203B41FA5}">
                           <a16:colId xmlns:a16="http://schemas.microsoft.com/office/drawing/2014/main" val="1583916392"/>
                         </a:ext>
                       </a:extLst>
                     </a:gridCol>
-                    <a:gridCol w="2486206">
+                    <a:gridCol w="2581155">
                       <a:extLst>
                         <a:ext uri="{9D8B030D-6E8A-4147-A177-3AD203B41FA5}">
                           <a16:colId xmlns:a16="http://schemas.microsoft.com/office/drawing/2014/main" val="2208840777"/>
                         </a:ext>
                       </a:extLst>
                     </a:gridCol>
-                    <a:gridCol w="2443421">
+                    <a:gridCol w="2406570">
                       <a:extLst>
                         <a:ext uri="{9D8B030D-6E8A-4147-A177-3AD203B41FA5}">
                           <a16:colId xmlns:a16="http://schemas.microsoft.com/office/drawing/2014/main" val="278051661"/>
@@ -4034,7 +4094,7 @@
                           <a:pPr algn="ctr"/>
                           <a:r>
                             <a:rPr lang="en-US" sz="1600" dirty="0"/>
-                            <a:t>TMDD+L </a:t>
+                            <a:t>Competitive TMDD </a:t>
                           </a:r>
                         </a:p>
                       </a:txBody>
@@ -4048,7 +4108,7 @@
                           <a:pPr algn="ctr"/>
                           <a:r>
                             <a:rPr lang="en-US" sz="1600"/>
-                            <a:t>TMDD+tissue</a:t>
+                            <a:t>Tissue TMDD</a:t>
                           </a:r>
                           <a:endParaRPr lang="en-US" sz="1600" dirty="0"/>
                         </a:p>
@@ -4266,7 +4326,7 @@
                         <a:blipFill>
                           <a:blip r:embed="rId2"/>
                           <a:stretch>
-                            <a:fillRect l="-45304" t="-179167" r="-314917" b="-635417"/>
+                            <a:fillRect l="-45304" t="-179167" r="-315470" b="-664583"/>
                           </a:stretch>
                         </a:blipFill>
                       </a:tcPr>
@@ -4293,7 +4353,7 @@
                         <a:blipFill>
                           <a:blip r:embed="rId2"/>
                           <a:stretch>
-                            <a:fillRect l="-145304" t="-179167" r="-214917" b="-635417"/>
+                            <a:fillRect l="-148588" t="-179167" r="-222599" b="-664583"/>
                           </a:stretch>
                         </a:blipFill>
                       </a:tcPr>
@@ -4310,7 +4370,7 @@
                         <a:blipFill>
                           <a:blip r:embed="rId2"/>
                           <a:stretch>
-                            <a:fillRect l="-226531" t="-179167" r="-98469" b="-635417"/>
+                            <a:fillRect l="-216749" t="-179167" r="-94089" b="-664583"/>
                           </a:stretch>
                         </a:blipFill>
                       </a:tcPr>
@@ -4327,7 +4387,7 @@
                         <a:blipFill>
                           <a:blip r:embed="rId2"/>
                           <a:stretch>
-                            <a:fillRect l="-331606" t="-179167" b="-635417"/>
+                            <a:fillRect l="-338421" t="-179167" r="-526" b="-664583"/>
                           </a:stretch>
                         </a:blipFill>
                       </a:tcPr>
@@ -4421,7 +4481,7 @@
                       </a:ext>
                     </a:extLst>
                   </a:tr>
-                  <a:tr h="1673061">
+                  <a:tr h="1838914">
                     <a:tc gridSpan="2">
                       <a:txBody>
                         <a:bodyPr/>
@@ -6001,52 +6061,6 @@
             </a:p>
           </p:txBody>
         </p:sp>
-        <p:cxnSp>
-          <p:nvCxnSpPr>
-            <p:cNvPr id="281" name="Straight Arrow Connector 280">
-              <a:extLst>
-                <a:ext uri="{FF2B5EF4-FFF2-40B4-BE49-F238E27FC236}">
-                  <a16:creationId xmlns:a16="http://schemas.microsoft.com/office/drawing/2014/main" id="{ACC266C9-63F7-AA4B-BDA5-40C8CB08F673}"/>
-                </a:ext>
-              </a:extLst>
-            </p:cNvPr>
-            <p:cNvCxnSpPr>
-              <a:cxnSpLocks/>
-            </p:cNvCxnSpPr>
-            <p:nvPr/>
-          </p:nvCxnSpPr>
-          <p:spPr>
-            <a:xfrm>
-              <a:off x="5227927" y="3154312"/>
-              <a:ext cx="0" cy="317090"/>
-            </a:xfrm>
-            <a:prstGeom prst="straightConnector1">
-              <a:avLst/>
-            </a:prstGeom>
-            <a:ln>
-              <a:solidFill>
-                <a:schemeClr val="tx1"/>
-              </a:solidFill>
-              <a:headEnd type="none" w="med" len="med"/>
-              <a:tailEnd type="triangle" w="med" len="med"/>
-            </a:ln>
-            <a:effectLst/>
-          </p:spPr>
-          <p:style>
-            <a:lnRef idx="2">
-              <a:schemeClr val="accent1"/>
-            </a:lnRef>
-            <a:fillRef idx="0">
-              <a:schemeClr val="accent1"/>
-            </a:fillRef>
-            <a:effectRef idx="1">
-              <a:schemeClr val="accent1"/>
-            </a:effectRef>
-            <a:fontRef idx="minor">
-              <a:schemeClr val="tx1"/>
-            </a:fontRef>
-          </p:style>
-        </p:cxnSp>
         <p:sp>
           <p:nvSpPr>
             <p:cNvPr id="282" name="TextBox 281">
@@ -7194,8 +7208,8 @@
         </p:nvSpPr>
         <p:spPr>
           <a:xfrm>
-            <a:off x="3102877" y="5821101"/>
-            <a:ext cx="4626422" cy="738664"/>
+            <a:off x="3064951" y="5963043"/>
+            <a:ext cx="7440100" cy="738664"/>
           </a:xfrm>
           <a:prstGeom prst="rect">
             <a:avLst/>
@@ -7211,36 +7225,36 @@
           <a:lstStyle/>
           <a:p>
             <a:r>
-              <a:rPr lang="en-US" sz="1600" dirty="0" err="1"/>
+              <a:rPr lang="en-US" sz="1600" dirty="0"/>
               <a:t>T</a:t>
             </a:r>
             <a:r>
-              <a:rPr lang="en-US" sz="1600" baseline="-25000" dirty="0" err="1"/>
-              <a:t>fold</a:t>
+              <a:rPr lang="en-US" sz="1600" baseline="-25000" dirty="0"/>
+              <a:t>fold,largeD</a:t>
             </a:r>
             <a:r>
               <a:rPr lang="en-US" sz="1600" dirty="0"/>
-              <a:t> = fold-increase in total target after binding drug</a:t>
-            </a:r>
-          </a:p>
-          <a:p>
-            <a:r>
-              <a:rPr lang="en-US" sz="1600" dirty="0" err="1"/>
-              <a:t>L</a:t>
-            </a:r>
-            <a:r>
-              <a:rPr lang="en-US" sz="1600" baseline="-25000" dirty="0" err="1"/>
-              <a:t>fold</a:t>
-            </a:r>
-            <a:r>
-              <a:rPr lang="en-US" sz="1600" dirty="0"/>
-              <a:t> = fold-increase in ligand after drug binds target</a:t>
+              <a:t> = max fold-increase in total target from baseline at steady state, for large doses</a:t>
             </a:r>
           </a:p>
           <a:p>
             <a:r>
               <a:rPr lang="en-US" sz="1600" dirty="0"/>
-              <a:t>B     = tissue biodistribution coefficient</a:t>
+              <a:t>L</a:t>
+            </a:r>
+            <a:r>
+              <a:rPr lang="en-US" sz="1600" baseline="-25000" dirty="0"/>
+              <a:t>fold,largeD</a:t>
+            </a:r>
+            <a:r>
+              <a:rPr lang="en-US" sz="1600" dirty="0"/>
+              <a:t> = max fold-increase in ligand from baseline at steady state, for large doses</a:t>
+            </a:r>
+          </a:p>
+          <a:p>
+            <a:r>
+              <a:rPr lang="en-US" sz="1600" dirty="0"/>
+              <a:t>B = tissue biodistribution coefficient</a:t>
             </a:r>
           </a:p>
         </p:txBody>
@@ -7259,10 +7273,10 @@
         </p:nvGrpSpPr>
         <p:grpSpPr>
           <a:xfrm>
-            <a:off x="8323856" y="3054333"/>
-            <a:ext cx="2286493" cy="3179909"/>
+            <a:off x="8323856" y="2874245"/>
+            <a:ext cx="2286493" cy="2931698"/>
             <a:chOff x="9185810" y="3087757"/>
-            <a:chExt cx="2286493" cy="3179909"/>
+            <a:chExt cx="2286493" cy="2931698"/>
           </a:xfrm>
         </p:grpSpPr>
         <p:sp>
@@ -7488,7 +7502,7 @@
           </p:nvSpPr>
           <p:spPr>
             <a:xfrm>
-              <a:off x="9612266" y="5901906"/>
+              <a:off x="9612266" y="5653695"/>
               <a:ext cx="365760" cy="365760"/>
             </a:xfrm>
             <a:prstGeom prst="rect">
@@ -9684,9 +9698,9 @@
           <p:grpSpPr>
             <a:xfrm>
               <a:off x="9764738" y="5378451"/>
-              <a:ext cx="45719" cy="507134"/>
+              <a:ext cx="45719" cy="275243"/>
               <a:chOff x="3900887" y="3136264"/>
-              <a:chExt cx="52709" cy="913067"/>
+              <a:chExt cx="52709" cy="495560"/>
             </a:xfrm>
             <a:noFill/>
           </p:grpSpPr>
@@ -9699,13 +9713,15 @@
                   </a:ext>
                 </a:extLst>
               </p:cNvPr>
-              <p:cNvCxnSpPr/>
+              <p:cNvCxnSpPr>
+                <a:cxnSpLocks/>
+              </p:cNvCxnSpPr>
               <p:nvPr/>
             </p:nvCxnSpPr>
             <p:spPr>
               <a:xfrm flipV="1">
                 <a:off x="3953596" y="3136264"/>
-                <a:ext cx="0" cy="893370"/>
+                <a:ext cx="0" cy="495560"/>
               </a:xfrm>
               <a:prstGeom prst="straightConnector1">
                 <a:avLst/>
@@ -9744,13 +9760,15 @@
                   </a:ext>
                 </a:extLst>
               </p:cNvPr>
-              <p:cNvCxnSpPr/>
+              <p:cNvCxnSpPr>
+                <a:cxnSpLocks/>
+              </p:cNvCxnSpPr>
               <p:nvPr/>
             </p:nvCxnSpPr>
             <p:spPr>
               <a:xfrm>
                 <a:off x="3900887" y="3159560"/>
-                <a:ext cx="0" cy="889771"/>
+                <a:ext cx="0" cy="472264"/>
               </a:xfrm>
               <a:prstGeom prst="straightConnector1">
                 <a:avLst/>

</xml_diff>